<commit_message>
Created .ppt and moved an image in report
</commit_message>
<xml_diff>
--- a/Report/Svømmehallen fremlæggelse.pptx
+++ b/Report/Svømmehallen fremlæggelse.pptx
@@ -6,6 +6,19 @@
   </p:sldMasterIdLst>
   <p:sldIdLst>
     <p:sldId id="256" r:id="rId2"/>
+    <p:sldId id="257" r:id="rId3"/>
+    <p:sldId id="258" r:id="rId4"/>
+    <p:sldId id="259" r:id="rId5"/>
+    <p:sldId id="260" r:id="rId6"/>
+    <p:sldId id="261" r:id="rId7"/>
+    <p:sldId id="262" r:id="rId8"/>
+    <p:sldId id="263" r:id="rId9"/>
+    <p:sldId id="264" r:id="rId10"/>
+    <p:sldId id="265" r:id="rId11"/>
+    <p:sldId id="266" r:id="rId12"/>
+    <p:sldId id="267" r:id="rId13"/>
+    <p:sldId id="268" r:id="rId14"/>
+    <p:sldId id="269" r:id="rId15"/>
   </p:sldIdLst>
   <p:sldSz cx="12192000" cy="6858000"/>
   <p:notesSz cx="6858000" cy="9144000"/>
@@ -104,6 +117,11 @@
       </a:defRPr>
     </a:lvl9pPr>
   </p:defaultTextStyle>
+  <p:extLst>
+    <p:ext uri="{EFAFB233-063F-42B5-8137-9DF3F51BA10A}">
+      <p15:sldGuideLst xmlns:p15="http://schemas.microsoft.com/office/powerpoint/2012/main"/>
+    </p:ext>
+  </p:extLst>
 </p:presentation>
 </file>
 
@@ -310,7 +328,7 @@
             <a:fld id="{B61BEF0D-F0BB-DE4B-95CE-6DB70DBA9567}" type="datetimeFigureOut">
               <a:rPr lang="en-US" dirty="0"/>
               <a:pPr/>
-              <a:t>12/9/2016</a:t>
+              <a:t>12/14/2016</a:t>
             </a:fld>
             <a:endParaRPr lang="en-US" dirty="0"/>
           </a:p>
@@ -598,7 +616,7 @@
             <a:fld id="{B61BEF0D-F0BB-DE4B-95CE-6DB70DBA9567}" type="datetimeFigureOut">
               <a:rPr lang="en-US" dirty="0"/>
               <a:pPr/>
-              <a:t>12/9/2016</a:t>
+              <a:t>12/14/2016</a:t>
             </a:fld>
             <a:endParaRPr lang="en-US" dirty="0"/>
           </a:p>
@@ -843,7 +861,7 @@
             <a:fld id="{B61BEF0D-F0BB-DE4B-95CE-6DB70DBA9567}" type="datetimeFigureOut">
               <a:rPr lang="en-US" dirty="0"/>
               <a:pPr/>
-              <a:t>12/9/2016</a:t>
+              <a:t>12/14/2016</a:t>
             </a:fld>
             <a:endParaRPr lang="en-US" dirty="0"/>
           </a:p>
@@ -1376,7 +1394,7 @@
             <a:fld id="{B61BEF0D-F0BB-DE4B-95CE-6DB70DBA9567}" type="datetimeFigureOut">
               <a:rPr lang="en-US" dirty="0"/>
               <a:pPr/>
-              <a:t>12/9/2016</a:t>
+              <a:t>12/14/2016</a:t>
             </a:fld>
             <a:endParaRPr lang="en-US" dirty="0"/>
           </a:p>
@@ -1621,7 +1639,7 @@
             <a:fld id="{B61BEF0D-F0BB-DE4B-95CE-6DB70DBA9567}" type="datetimeFigureOut">
               <a:rPr lang="en-US" dirty="0"/>
               <a:pPr/>
-              <a:t>12/9/2016</a:t>
+              <a:t>12/14/2016</a:t>
             </a:fld>
             <a:endParaRPr lang="en-US" dirty="0"/>
           </a:p>
@@ -2161,7 +2179,7 @@
             <a:fld id="{B61BEF0D-F0BB-DE4B-95CE-6DB70DBA9567}" type="datetimeFigureOut">
               <a:rPr lang="en-US" dirty="0"/>
               <a:pPr/>
-              <a:t>12/9/2016</a:t>
+              <a:t>12/14/2016</a:t>
             </a:fld>
             <a:endParaRPr lang="en-US" dirty="0"/>
           </a:p>
@@ -2468,7 +2486,7 @@
             <a:fld id="{B61BEF0D-F0BB-DE4B-95CE-6DB70DBA9567}" type="datetimeFigureOut">
               <a:rPr lang="en-US" dirty="0"/>
               <a:pPr/>
-              <a:t>12/9/2016</a:t>
+              <a:t>12/14/2016</a:t>
             </a:fld>
             <a:endParaRPr lang="en-US" dirty="0"/>
           </a:p>
@@ -2640,7 +2658,7 @@
             <a:fld id="{B61BEF0D-F0BB-DE4B-95CE-6DB70DBA9567}" type="datetimeFigureOut">
               <a:rPr lang="en-US" dirty="0"/>
               <a:pPr/>
-              <a:t>12/9/2016</a:t>
+              <a:t>12/14/2016</a:t>
             </a:fld>
             <a:endParaRPr lang="en-US" dirty="0"/>
           </a:p>
@@ -2817,7 +2835,7 @@
             <a:fld id="{B61BEF0D-F0BB-DE4B-95CE-6DB70DBA9567}" type="datetimeFigureOut">
               <a:rPr lang="en-US" dirty="0"/>
               <a:pPr/>
-              <a:t>12/9/2016</a:t>
+              <a:t>12/14/2016</a:t>
             </a:fld>
             <a:endParaRPr lang="en-US" dirty="0"/>
           </a:p>
@@ -2984,7 +3002,7 @@
             <a:fld id="{B61BEF0D-F0BB-DE4B-95CE-6DB70DBA9567}" type="datetimeFigureOut">
               <a:rPr lang="en-US" dirty="0"/>
               <a:pPr/>
-              <a:t>12/9/2016</a:t>
+              <a:t>12/14/2016</a:t>
             </a:fld>
             <a:endParaRPr lang="en-US" dirty="0"/>
           </a:p>
@@ -3227,7 +3245,7 @@
             <a:fld id="{B61BEF0D-F0BB-DE4B-95CE-6DB70DBA9567}" type="datetimeFigureOut">
               <a:rPr lang="en-US" dirty="0"/>
               <a:pPr/>
-              <a:t>12/9/2016</a:t>
+              <a:t>12/14/2016</a:t>
             </a:fld>
             <a:endParaRPr lang="en-US" dirty="0"/>
           </a:p>
@@ -3516,7 +3534,7 @@
             <a:fld id="{B61BEF0D-F0BB-DE4B-95CE-6DB70DBA9567}" type="datetimeFigureOut">
               <a:rPr lang="en-US" dirty="0"/>
               <a:pPr/>
-              <a:t>12/9/2016</a:t>
+              <a:t>12/14/2016</a:t>
             </a:fld>
             <a:endParaRPr lang="en-US" dirty="0"/>
           </a:p>
@@ -3943,7 +3961,7 @@
             <a:fld id="{B61BEF0D-F0BB-DE4B-95CE-6DB70DBA9567}" type="datetimeFigureOut">
               <a:rPr lang="en-US" dirty="0"/>
               <a:pPr/>
-              <a:t>12/9/2016</a:t>
+              <a:t>12/14/2016</a:t>
             </a:fld>
             <a:endParaRPr lang="en-US" dirty="0"/>
           </a:p>
@@ -4063,7 +4081,7 @@
             <a:fld id="{B61BEF0D-F0BB-DE4B-95CE-6DB70DBA9567}" type="datetimeFigureOut">
               <a:rPr lang="en-US" dirty="0"/>
               <a:pPr/>
-              <a:t>12/9/2016</a:t>
+              <a:t>12/14/2016</a:t>
             </a:fld>
             <a:endParaRPr lang="en-US" dirty="0"/>
           </a:p>
@@ -4155,7 +4173,7 @@
             <a:fld id="{B61BEF0D-F0BB-DE4B-95CE-6DB70DBA9567}" type="datetimeFigureOut">
               <a:rPr lang="en-US" dirty="0"/>
               <a:pPr/>
-              <a:t>12/9/2016</a:t>
+              <a:t>12/14/2016</a:t>
             </a:fld>
             <a:endParaRPr lang="en-US" dirty="0"/>
           </a:p>
@@ -4435,7 +4453,7 @@
             <a:fld id="{B61BEF0D-F0BB-DE4B-95CE-6DB70DBA9567}" type="datetimeFigureOut">
               <a:rPr lang="en-US" dirty="0"/>
               <a:pPr/>
-              <a:t>12/9/2016</a:t>
+              <a:t>12/14/2016</a:t>
             </a:fld>
             <a:endParaRPr lang="en-US" dirty="0"/>
           </a:p>
@@ -4723,7 +4741,7 @@
             <a:fld id="{B61BEF0D-F0BB-DE4B-95CE-6DB70DBA9567}" type="datetimeFigureOut">
               <a:rPr lang="en-US" dirty="0"/>
               <a:pPr/>
-              <a:t>12/9/2016</a:t>
+              <a:t>12/14/2016</a:t>
             </a:fld>
             <a:endParaRPr lang="en-US" dirty="0"/>
           </a:p>
@@ -4951,7 +4969,7 @@
             <a:fld id="{B61BEF0D-F0BB-DE4B-95CE-6DB70DBA9567}" type="datetimeFigureOut">
               <a:rPr lang="en-US" dirty="0"/>
               <a:pPr/>
-              <a:t>12/9/2016</a:t>
+              <a:t>12/14/2016</a:t>
             </a:fld>
             <a:endParaRPr lang="en-US" dirty="0"/>
           </a:p>
@@ -5677,6 +5695,1562 @@
   <p:clrMapOvr>
     <a:masterClrMapping/>
   </p:clrMapOvr>
+  <p:timing>
+    <p:tnLst>
+      <p:par>
+        <p:cTn id="1" dur="indefinite" restart="never" nodeType="tmRoot"/>
+      </p:par>
+    </p:tnLst>
+  </p:timing>
+</p:sld>
+</file>
+
+<file path=ppt/slides/slide10.xml><?xml version="1.0" encoding="utf-8"?>
+<p:sld xmlns:a="http://schemas.openxmlformats.org/drawingml/2006/main" xmlns:r="http://schemas.openxmlformats.org/officeDocument/2006/relationships" xmlns:p="http://schemas.openxmlformats.org/presentationml/2006/main">
+  <p:cSld>
+    <p:spTree>
+      <p:nvGrpSpPr>
+        <p:cNvPr id="1" name=""/>
+        <p:cNvGrpSpPr/>
+        <p:nvPr/>
+      </p:nvGrpSpPr>
+      <p:grpSpPr>
+        <a:xfrm>
+          <a:off x="0" y="0"/>
+          <a:ext cx="0" cy="0"/>
+          <a:chOff x="0" y="0"/>
+          <a:chExt cx="0" cy="0"/>
+        </a:xfrm>
+      </p:grpSpPr>
+      <p:sp>
+        <p:nvSpPr>
+          <p:cNvPr id="2" name="Titel 1"/>
+          <p:cNvSpPr>
+            <a:spLocks noGrp="1"/>
+          </p:cNvSpPr>
+          <p:nvPr>
+            <p:ph type="title"/>
+          </p:nvPr>
+        </p:nvSpPr>
+        <p:spPr/>
+        <p:txBody>
+          <a:bodyPr>
+            <a:normAutofit/>
+          </a:bodyPr>
+          <a:lstStyle/>
+          <a:p>
+            <a:pPr algn="ctr"/>
+            <a:r>
+              <a:rPr lang="en-GB" sz="4800" dirty="0" smtClean="0"/>
+              <a:t>Use-cases</a:t>
+            </a:r>
+            <a:endParaRPr lang="en-GB" sz="4800" dirty="0"/>
+          </a:p>
+        </p:txBody>
+      </p:sp>
+      <p:sp>
+        <p:nvSpPr>
+          <p:cNvPr id="3" name="Pladsholder til indhold 2"/>
+          <p:cNvSpPr>
+            <a:spLocks noGrp="1"/>
+          </p:cNvSpPr>
+          <p:nvPr>
+            <p:ph idx="1"/>
+          </p:nvPr>
+        </p:nvSpPr>
+        <p:spPr/>
+        <p:txBody>
+          <a:bodyPr/>
+          <a:lstStyle/>
+          <a:p>
+            <a:r>
+              <a:rPr lang="en-GB" dirty="0" err="1" smtClean="0"/>
+              <a:t>Opret</a:t>
+            </a:r>
+            <a:r>
+              <a:rPr lang="en-GB" dirty="0" smtClean="0"/>
+              <a:t> </a:t>
+            </a:r>
+            <a:r>
+              <a:rPr lang="en-GB" dirty="0" err="1" smtClean="0"/>
+              <a:t>nyt</a:t>
+            </a:r>
+            <a:r>
+              <a:rPr lang="en-GB" dirty="0" smtClean="0"/>
+              <a:t> </a:t>
+            </a:r>
+            <a:r>
+              <a:rPr lang="en-GB" dirty="0" err="1" smtClean="0"/>
+              <a:t>medlem</a:t>
+            </a:r>
+            <a:endParaRPr lang="en-GB" dirty="0" smtClean="0"/>
+          </a:p>
+          <a:p>
+            <a:r>
+              <a:rPr lang="en-GB" dirty="0" smtClean="0"/>
+              <a:t>Vis </a:t>
+            </a:r>
+            <a:r>
+              <a:rPr lang="en-GB" dirty="0" err="1" smtClean="0"/>
+              <a:t>kunder</a:t>
+            </a:r>
+            <a:r>
+              <a:rPr lang="en-GB" dirty="0" smtClean="0"/>
+              <a:t> </a:t>
+            </a:r>
+            <a:r>
+              <a:rPr lang="en-GB" dirty="0" err="1" smtClean="0"/>
+              <a:t>i</a:t>
+            </a:r>
+            <a:r>
+              <a:rPr lang="en-GB" dirty="0" smtClean="0"/>
+              <a:t> </a:t>
+            </a:r>
+            <a:r>
+              <a:rPr lang="en-GB" dirty="0" err="1" smtClean="0"/>
+              <a:t>restance</a:t>
+            </a:r>
+            <a:endParaRPr lang="en-GB" dirty="0" smtClean="0"/>
+          </a:p>
+          <a:p>
+            <a:r>
+              <a:rPr lang="en-GB" dirty="0" smtClean="0"/>
+              <a:t>Vis </a:t>
+            </a:r>
+            <a:r>
+              <a:rPr lang="en-GB" dirty="0" err="1" smtClean="0"/>
+              <a:t>overblik</a:t>
+            </a:r>
+            <a:r>
+              <a:rPr lang="en-GB" dirty="0" smtClean="0"/>
+              <a:t> over </a:t>
+            </a:r>
+            <a:r>
+              <a:rPr lang="en-GB" dirty="0" err="1" smtClean="0"/>
+              <a:t>rekorder</a:t>
+            </a:r>
+            <a:endParaRPr lang="en-GB" dirty="0"/>
+          </a:p>
+        </p:txBody>
+      </p:sp>
+    </p:spTree>
+    <p:extLst>
+      <p:ext uri="{BB962C8B-B14F-4D97-AF65-F5344CB8AC3E}">
+        <p14:creationId xmlns:p14="http://schemas.microsoft.com/office/powerpoint/2010/main" val="480402168"/>
+      </p:ext>
+    </p:extLst>
+  </p:cSld>
+  <p:clrMapOvr>
+    <a:masterClrMapping/>
+  </p:clrMapOvr>
+  <p:timing>
+    <p:tnLst>
+      <p:par>
+        <p:cTn id="1" dur="indefinite" restart="never" nodeType="tmRoot"/>
+      </p:par>
+    </p:tnLst>
+  </p:timing>
+</p:sld>
+</file>
+
+<file path=ppt/slides/slide11.xml><?xml version="1.0" encoding="utf-8"?>
+<p:sld xmlns:a="http://schemas.openxmlformats.org/drawingml/2006/main" xmlns:r="http://schemas.openxmlformats.org/officeDocument/2006/relationships" xmlns:p="http://schemas.openxmlformats.org/presentationml/2006/main">
+  <p:cSld>
+    <p:spTree>
+      <p:nvGrpSpPr>
+        <p:cNvPr id="1" name=""/>
+        <p:cNvGrpSpPr/>
+        <p:nvPr/>
+      </p:nvGrpSpPr>
+      <p:grpSpPr>
+        <a:xfrm>
+          <a:off x="0" y="0"/>
+          <a:ext cx="0" cy="0"/>
+          <a:chOff x="0" y="0"/>
+          <a:chExt cx="0" cy="0"/>
+        </a:xfrm>
+      </p:grpSpPr>
+      <p:sp>
+        <p:nvSpPr>
+          <p:cNvPr id="2" name="Titel 1"/>
+          <p:cNvSpPr>
+            <a:spLocks noGrp="1"/>
+          </p:cNvSpPr>
+          <p:nvPr>
+            <p:ph type="title"/>
+          </p:nvPr>
+        </p:nvSpPr>
+        <p:spPr/>
+        <p:txBody>
+          <a:bodyPr>
+            <a:normAutofit/>
+          </a:bodyPr>
+          <a:lstStyle/>
+          <a:p>
+            <a:pPr algn="ctr"/>
+            <a:r>
+              <a:rPr lang="en-GB" sz="4800" dirty="0" smtClean="0"/>
+              <a:t>Sequence diagrams</a:t>
+            </a:r>
+            <a:endParaRPr lang="en-GB" sz="4800" dirty="0"/>
+          </a:p>
+        </p:txBody>
+      </p:sp>
+      <p:pic>
+        <p:nvPicPr>
+          <p:cNvPr id="3" name="Billede 2" descr="C:\Users\soren\Desktop\GitHub\ExamFirstSem\Dolphin\Diagrams\Lav nyt medlem SSD.jpg"/>
+          <p:cNvPicPr/>
+          <p:nvPr/>
+        </p:nvPicPr>
+        <p:blipFill>
+          <a:blip r:embed="rId2">
+            <a:extLst>
+              <a:ext uri="{28A0092B-C50C-407E-A947-70E740481C1C}">
+                <a14:useLocalDpi xmlns:a14="http://schemas.microsoft.com/office/drawing/2010/main" val="0"/>
+              </a:ext>
+            </a:extLst>
+          </a:blip>
+          <a:srcRect/>
+          <a:stretch>
+            <a:fillRect/>
+          </a:stretch>
+        </p:blipFill>
+        <p:spPr bwMode="auto">
+          <a:xfrm>
+            <a:off x="0" y="2691227"/>
+            <a:ext cx="4343400" cy="4046220"/>
+          </a:xfrm>
+          <a:prstGeom prst="rect">
+            <a:avLst/>
+          </a:prstGeom>
+          <a:noFill/>
+          <a:ln>
+            <a:noFill/>
+          </a:ln>
+        </p:spPr>
+      </p:pic>
+      <p:pic>
+        <p:nvPicPr>
+          <p:cNvPr id="4" name="Billede 3" descr="Kasserer vælger overblik over kunder i restance funktionen2"/>
+          <p:cNvPicPr/>
+          <p:nvPr/>
+        </p:nvPicPr>
+        <p:blipFill>
+          <a:blip r:embed="rId3">
+            <a:extLst>
+              <a:ext uri="{28A0092B-C50C-407E-A947-70E740481C1C}">
+                <a14:useLocalDpi xmlns:a14="http://schemas.microsoft.com/office/drawing/2010/main" val="0"/>
+              </a:ext>
+            </a:extLst>
+          </a:blip>
+          <a:srcRect/>
+          <a:stretch>
+            <a:fillRect/>
+          </a:stretch>
+        </p:blipFill>
+        <p:spPr bwMode="auto">
+          <a:xfrm>
+            <a:off x="4343400" y="2192117"/>
+            <a:ext cx="5013960" cy="2522220"/>
+          </a:xfrm>
+          <a:prstGeom prst="rect">
+            <a:avLst/>
+          </a:prstGeom>
+          <a:noFill/>
+          <a:ln>
+            <a:noFill/>
+          </a:ln>
+        </p:spPr>
+      </p:pic>
+      <p:pic>
+        <p:nvPicPr>
+          <p:cNvPr id="5" name="Billede 4" descr="C:\Users\soren\Desktop\GitHub\ExamFirstSem\Dolphin\Diagrams\Bedste svømmertider SSD.jpg"/>
+          <p:cNvPicPr/>
+          <p:nvPr/>
+        </p:nvPicPr>
+        <p:blipFill>
+          <a:blip r:embed="rId4">
+            <a:extLst>
+              <a:ext uri="{28A0092B-C50C-407E-A947-70E740481C1C}">
+                <a14:useLocalDpi xmlns:a14="http://schemas.microsoft.com/office/drawing/2010/main" val="0"/>
+              </a:ext>
+            </a:extLst>
+          </a:blip>
+          <a:srcRect/>
+          <a:stretch>
+            <a:fillRect/>
+          </a:stretch>
+        </p:blipFill>
+        <p:spPr bwMode="auto">
+          <a:xfrm>
+            <a:off x="8099282" y="4012231"/>
+            <a:ext cx="3567430" cy="2559050"/>
+          </a:xfrm>
+          <a:prstGeom prst="rect">
+            <a:avLst/>
+          </a:prstGeom>
+          <a:noFill/>
+          <a:ln>
+            <a:noFill/>
+          </a:ln>
+        </p:spPr>
+      </p:pic>
+    </p:spTree>
+    <p:extLst>
+      <p:ext uri="{BB962C8B-B14F-4D97-AF65-F5344CB8AC3E}">
+        <p14:creationId xmlns:p14="http://schemas.microsoft.com/office/powerpoint/2010/main" val="3194657663"/>
+      </p:ext>
+    </p:extLst>
+  </p:cSld>
+  <p:clrMapOvr>
+    <a:masterClrMapping/>
+  </p:clrMapOvr>
+  <p:timing>
+    <p:tnLst>
+      <p:par>
+        <p:cTn id="1" dur="indefinite" restart="never" nodeType="tmRoot"/>
+      </p:par>
+    </p:tnLst>
+  </p:timing>
+</p:sld>
+</file>
+
+<file path=ppt/slides/slide12.xml><?xml version="1.0" encoding="utf-8"?>
+<p:sld xmlns:a="http://schemas.openxmlformats.org/drawingml/2006/main" xmlns:r="http://schemas.openxmlformats.org/officeDocument/2006/relationships" xmlns:p="http://schemas.openxmlformats.org/presentationml/2006/main">
+  <p:cSld>
+    <p:spTree>
+      <p:nvGrpSpPr>
+        <p:cNvPr id="1" name=""/>
+        <p:cNvGrpSpPr/>
+        <p:nvPr/>
+      </p:nvGrpSpPr>
+      <p:grpSpPr>
+        <a:xfrm>
+          <a:off x="0" y="0"/>
+          <a:ext cx="0" cy="0"/>
+          <a:chOff x="0" y="0"/>
+          <a:chExt cx="0" cy="0"/>
+        </a:xfrm>
+      </p:grpSpPr>
+      <p:sp>
+        <p:nvSpPr>
+          <p:cNvPr id="2" name="Titel 1"/>
+          <p:cNvSpPr>
+            <a:spLocks noGrp="1"/>
+          </p:cNvSpPr>
+          <p:nvPr>
+            <p:ph type="title"/>
+          </p:nvPr>
+        </p:nvSpPr>
+        <p:spPr/>
+        <p:txBody>
+          <a:bodyPr>
+            <a:normAutofit/>
+          </a:bodyPr>
+          <a:lstStyle/>
+          <a:p>
+            <a:pPr algn="ctr"/>
+            <a:r>
+              <a:rPr lang="en-GB" sz="4800" dirty="0" smtClean="0"/>
+              <a:t>SWC</a:t>
+            </a:r>
+            <a:endParaRPr lang="en-GB" sz="4800" dirty="0"/>
+          </a:p>
+        </p:txBody>
+      </p:sp>
+      <p:sp>
+        <p:nvSpPr>
+          <p:cNvPr id="3" name="Pladsholder til indhold 2"/>
+          <p:cNvSpPr>
+            <a:spLocks noGrp="1"/>
+          </p:cNvSpPr>
+          <p:nvPr>
+            <p:ph idx="1"/>
+          </p:nvPr>
+        </p:nvSpPr>
+        <p:spPr/>
+        <p:txBody>
+          <a:bodyPr/>
+          <a:lstStyle/>
+          <a:p>
+            <a:r>
+              <a:rPr lang="en-GB" dirty="0" err="1" smtClean="0"/>
+              <a:t>Programmet</a:t>
+            </a:r>
+            <a:endParaRPr lang="en-GB" dirty="0"/>
+          </a:p>
+          <a:p>
+            <a:r>
+              <a:rPr lang="en-GB" dirty="0" err="1" smtClean="0"/>
+              <a:t>Programmets</a:t>
+            </a:r>
+            <a:r>
+              <a:rPr lang="en-GB" dirty="0" smtClean="0"/>
+              <a:t> </a:t>
+            </a:r>
+            <a:r>
+              <a:rPr lang="en-GB" dirty="0" err="1" smtClean="0"/>
+              <a:t>konstruktion</a:t>
+            </a:r>
+            <a:endParaRPr lang="en-GB" dirty="0"/>
+          </a:p>
+        </p:txBody>
+      </p:sp>
+    </p:spTree>
+    <p:extLst>
+      <p:ext uri="{BB962C8B-B14F-4D97-AF65-F5344CB8AC3E}">
+        <p14:creationId xmlns:p14="http://schemas.microsoft.com/office/powerpoint/2010/main" val="1345523401"/>
+      </p:ext>
+    </p:extLst>
+  </p:cSld>
+  <p:clrMapOvr>
+    <a:masterClrMapping/>
+  </p:clrMapOvr>
+  <p:timing>
+    <p:tnLst>
+      <p:par>
+        <p:cTn id="1" dur="indefinite" restart="never" nodeType="tmRoot"/>
+      </p:par>
+    </p:tnLst>
+  </p:timing>
+</p:sld>
+</file>
+
+<file path=ppt/slides/slide13.xml><?xml version="1.0" encoding="utf-8"?>
+<p:sld xmlns:a="http://schemas.openxmlformats.org/drawingml/2006/main" xmlns:r="http://schemas.openxmlformats.org/officeDocument/2006/relationships" xmlns:p="http://schemas.openxmlformats.org/presentationml/2006/main">
+  <p:cSld>
+    <p:spTree>
+      <p:nvGrpSpPr>
+        <p:cNvPr id="1" name=""/>
+        <p:cNvGrpSpPr/>
+        <p:nvPr/>
+      </p:nvGrpSpPr>
+      <p:grpSpPr>
+        <a:xfrm>
+          <a:off x="0" y="0"/>
+          <a:ext cx="0" cy="0"/>
+          <a:chOff x="0" y="0"/>
+          <a:chExt cx="0" cy="0"/>
+        </a:xfrm>
+      </p:grpSpPr>
+      <p:sp>
+        <p:nvSpPr>
+          <p:cNvPr id="2" name="Titel 1"/>
+          <p:cNvSpPr>
+            <a:spLocks noGrp="1"/>
+          </p:cNvSpPr>
+          <p:nvPr>
+            <p:ph type="title"/>
+          </p:nvPr>
+        </p:nvSpPr>
+        <p:spPr/>
+        <p:txBody>
+          <a:bodyPr>
+            <a:normAutofit/>
+          </a:bodyPr>
+          <a:lstStyle/>
+          <a:p>
+            <a:pPr algn="ctr"/>
+            <a:r>
+              <a:rPr lang="en-GB" sz="4800" dirty="0" err="1" smtClean="0"/>
+              <a:t>Programmet</a:t>
+            </a:r>
+            <a:endParaRPr lang="en-GB" sz="4800" dirty="0"/>
+          </a:p>
+        </p:txBody>
+      </p:sp>
+      <p:sp>
+        <p:nvSpPr>
+          <p:cNvPr id="3" name="Pladsholder til indhold 2"/>
+          <p:cNvSpPr>
+            <a:spLocks noGrp="1"/>
+          </p:cNvSpPr>
+          <p:nvPr>
+            <p:ph idx="1"/>
+          </p:nvPr>
+        </p:nvSpPr>
+        <p:spPr/>
+        <p:txBody>
+          <a:bodyPr/>
+          <a:lstStyle/>
+          <a:p>
+            <a:endParaRPr lang="en-GB" dirty="0"/>
+          </a:p>
+        </p:txBody>
+      </p:sp>
+      <p:pic>
+        <p:nvPicPr>
+          <p:cNvPr id="1026" name="Picture 2" descr="Billedresultat for jgrasp icon"/>
+          <p:cNvPicPr>
+            <a:picLocks noChangeAspect="1" noChangeArrowheads="1"/>
+          </p:cNvPicPr>
+          <p:nvPr/>
+        </p:nvPicPr>
+        <p:blipFill>
+          <a:blip r:embed="rId2">
+            <a:extLst>
+              <a:ext uri="{28A0092B-C50C-407E-A947-70E740481C1C}">
+                <a14:useLocalDpi xmlns:a14="http://schemas.microsoft.com/office/drawing/2010/main" val="0"/>
+              </a:ext>
+            </a:extLst>
+          </a:blip>
+          <a:srcRect/>
+          <a:stretch>
+            <a:fillRect/>
+          </a:stretch>
+        </p:blipFill>
+        <p:spPr bwMode="auto">
+          <a:xfrm>
+            <a:off x="3925319" y="3114136"/>
+            <a:ext cx="4000500" cy="1905000"/>
+          </a:xfrm>
+          <a:prstGeom prst="rect">
+            <a:avLst/>
+          </a:prstGeom>
+          <a:noFill/>
+          <a:extLst>
+            <a:ext uri="{909E8E84-426E-40DD-AFC4-6F175D3DCCD1}">
+              <a14:hiddenFill xmlns:a14="http://schemas.microsoft.com/office/drawing/2010/main">
+                <a:solidFill>
+                  <a:srgbClr val="FFFFFF"/>
+                </a:solidFill>
+              </a14:hiddenFill>
+            </a:ext>
+          </a:extLst>
+        </p:spPr>
+      </p:pic>
+    </p:spTree>
+    <p:extLst>
+      <p:ext uri="{BB962C8B-B14F-4D97-AF65-F5344CB8AC3E}">
+        <p14:creationId xmlns:p14="http://schemas.microsoft.com/office/powerpoint/2010/main" val="2754039976"/>
+      </p:ext>
+    </p:extLst>
+  </p:cSld>
+  <p:clrMapOvr>
+    <a:masterClrMapping/>
+  </p:clrMapOvr>
+  <p:timing>
+    <p:tnLst>
+      <p:par>
+        <p:cTn id="1" dur="indefinite" restart="never" nodeType="tmRoot"/>
+      </p:par>
+    </p:tnLst>
+  </p:timing>
+</p:sld>
+</file>
+
+<file path=ppt/slides/slide14.xml><?xml version="1.0" encoding="utf-8"?>
+<p:sld xmlns:a="http://schemas.openxmlformats.org/drawingml/2006/main" xmlns:r="http://schemas.openxmlformats.org/officeDocument/2006/relationships" xmlns:p="http://schemas.openxmlformats.org/presentationml/2006/main">
+  <p:cSld>
+    <p:spTree>
+      <p:nvGrpSpPr>
+        <p:cNvPr id="1" name=""/>
+        <p:cNvGrpSpPr/>
+        <p:nvPr/>
+      </p:nvGrpSpPr>
+      <p:grpSpPr>
+        <a:xfrm>
+          <a:off x="0" y="0"/>
+          <a:ext cx="0" cy="0"/>
+          <a:chOff x="0" y="0"/>
+          <a:chExt cx="0" cy="0"/>
+        </a:xfrm>
+      </p:grpSpPr>
+      <p:sp>
+        <p:nvSpPr>
+          <p:cNvPr id="2" name="Titel 1"/>
+          <p:cNvSpPr>
+            <a:spLocks noGrp="1"/>
+          </p:cNvSpPr>
+          <p:nvPr>
+            <p:ph type="title"/>
+          </p:nvPr>
+        </p:nvSpPr>
+        <p:spPr/>
+        <p:txBody>
+          <a:bodyPr>
+            <a:normAutofit/>
+          </a:bodyPr>
+          <a:lstStyle/>
+          <a:p>
+            <a:pPr algn="ctr"/>
+            <a:r>
+              <a:rPr lang="en-GB" sz="4800" dirty="0" err="1" smtClean="0"/>
+              <a:t>Programmets</a:t>
+            </a:r>
+            <a:r>
+              <a:rPr lang="en-GB" sz="4800" dirty="0" smtClean="0"/>
+              <a:t> </a:t>
+            </a:r>
+            <a:r>
+              <a:rPr lang="en-GB" sz="4800" dirty="0" err="1" smtClean="0"/>
+              <a:t>konstruktion</a:t>
+            </a:r>
+            <a:endParaRPr lang="en-GB" sz="4800" dirty="0"/>
+          </a:p>
+        </p:txBody>
+      </p:sp>
+      <p:sp>
+        <p:nvSpPr>
+          <p:cNvPr id="3" name="Pladsholder til indhold 2"/>
+          <p:cNvSpPr>
+            <a:spLocks noGrp="1"/>
+          </p:cNvSpPr>
+          <p:nvPr>
+            <p:ph idx="1"/>
+          </p:nvPr>
+        </p:nvSpPr>
+        <p:spPr/>
+        <p:txBody>
+          <a:bodyPr/>
+          <a:lstStyle/>
+          <a:p>
+            <a:r>
+              <a:rPr lang="en-GB" dirty="0" err="1" smtClean="0"/>
+              <a:t>Specielle</a:t>
+            </a:r>
+            <a:r>
+              <a:rPr lang="en-GB" dirty="0" smtClean="0"/>
+              <a:t> </a:t>
+            </a:r>
+            <a:r>
+              <a:rPr lang="en-GB" dirty="0" err="1" smtClean="0"/>
+              <a:t>klasser</a:t>
+            </a:r>
+            <a:r>
+              <a:rPr lang="en-GB" dirty="0" smtClean="0"/>
+              <a:t> / </a:t>
+            </a:r>
+            <a:r>
+              <a:rPr lang="en-GB" dirty="0" err="1" smtClean="0"/>
+              <a:t>moduler</a:t>
+            </a:r>
+            <a:endParaRPr lang="en-GB" dirty="0" smtClean="0"/>
+          </a:p>
+          <a:p>
+            <a:r>
+              <a:rPr lang="en-GB" dirty="0" smtClean="0"/>
+              <a:t>Simple* </a:t>
+            </a:r>
+            <a:r>
+              <a:rPr lang="en-GB" smtClean="0"/>
+              <a:t>metoder</a:t>
+            </a:r>
+            <a:endParaRPr lang="en-GB" dirty="0" smtClean="0"/>
+          </a:p>
+        </p:txBody>
+      </p:sp>
+    </p:spTree>
+    <p:extLst>
+      <p:ext uri="{BB962C8B-B14F-4D97-AF65-F5344CB8AC3E}">
+        <p14:creationId xmlns:p14="http://schemas.microsoft.com/office/powerpoint/2010/main" val="2777012602"/>
+      </p:ext>
+    </p:extLst>
+  </p:cSld>
+  <p:clrMapOvr>
+    <a:masterClrMapping/>
+  </p:clrMapOvr>
+  <p:timing>
+    <p:tnLst>
+      <p:par>
+        <p:cTn id="1" dur="indefinite" restart="never" nodeType="tmRoot"/>
+      </p:par>
+    </p:tnLst>
+  </p:timing>
+</p:sld>
+</file>
+
+<file path=ppt/slides/slide2.xml><?xml version="1.0" encoding="utf-8"?>
+<p:sld xmlns:a="http://schemas.openxmlformats.org/drawingml/2006/main" xmlns:r="http://schemas.openxmlformats.org/officeDocument/2006/relationships" xmlns:p="http://schemas.openxmlformats.org/presentationml/2006/main">
+  <p:cSld>
+    <p:spTree>
+      <p:nvGrpSpPr>
+        <p:cNvPr id="1" name=""/>
+        <p:cNvGrpSpPr/>
+        <p:nvPr/>
+      </p:nvGrpSpPr>
+      <p:grpSpPr>
+        <a:xfrm>
+          <a:off x="0" y="0"/>
+          <a:ext cx="0" cy="0"/>
+          <a:chOff x="0" y="0"/>
+          <a:chExt cx="0" cy="0"/>
+        </a:xfrm>
+      </p:grpSpPr>
+      <p:sp>
+        <p:nvSpPr>
+          <p:cNvPr id="2" name="Titel 1"/>
+          <p:cNvSpPr>
+            <a:spLocks noGrp="1"/>
+          </p:cNvSpPr>
+          <p:nvPr>
+            <p:ph type="title"/>
+          </p:nvPr>
+        </p:nvSpPr>
+        <p:spPr/>
+        <p:txBody>
+          <a:bodyPr/>
+          <a:lstStyle/>
+          <a:p>
+            <a:pPr algn="ctr"/>
+            <a:r>
+              <a:rPr lang="en-GB" sz="4800" dirty="0" smtClean="0"/>
+              <a:t>ITO</a:t>
+            </a:r>
+            <a:endParaRPr lang="en-GB" sz="4800" dirty="0"/>
+          </a:p>
+        </p:txBody>
+      </p:sp>
+      <p:sp>
+        <p:nvSpPr>
+          <p:cNvPr id="3" name="Pladsholder til indhold 2"/>
+          <p:cNvSpPr>
+            <a:spLocks noGrp="1"/>
+          </p:cNvSpPr>
+          <p:nvPr>
+            <p:ph idx="1"/>
+          </p:nvPr>
+        </p:nvSpPr>
+        <p:spPr/>
+        <p:txBody>
+          <a:bodyPr/>
+          <a:lstStyle/>
+          <a:p>
+            <a:r>
+              <a:rPr lang="en-GB" dirty="0" smtClean="0"/>
+              <a:t>S.W.O.T. Analyse</a:t>
+            </a:r>
+          </a:p>
+          <a:p>
+            <a:r>
+              <a:rPr lang="en-GB" dirty="0" err="1" smtClean="0"/>
+              <a:t>Virksomhedbeskrivelse</a:t>
+            </a:r>
+            <a:endParaRPr lang="en-GB" dirty="0"/>
+          </a:p>
+        </p:txBody>
+      </p:sp>
+    </p:spTree>
+    <p:extLst>
+      <p:ext uri="{BB962C8B-B14F-4D97-AF65-F5344CB8AC3E}">
+        <p14:creationId xmlns:p14="http://schemas.microsoft.com/office/powerpoint/2010/main" val="4035119673"/>
+      </p:ext>
+    </p:extLst>
+  </p:cSld>
+  <p:clrMapOvr>
+    <a:masterClrMapping/>
+  </p:clrMapOvr>
+  <p:timing>
+    <p:tnLst>
+      <p:par>
+        <p:cTn id="1" dur="indefinite" restart="never" nodeType="tmRoot"/>
+      </p:par>
+    </p:tnLst>
+  </p:timing>
+</p:sld>
+</file>
+
+<file path=ppt/slides/slide3.xml><?xml version="1.0" encoding="utf-8"?>
+<p:sld xmlns:a="http://schemas.openxmlformats.org/drawingml/2006/main" xmlns:r="http://schemas.openxmlformats.org/officeDocument/2006/relationships" xmlns:p="http://schemas.openxmlformats.org/presentationml/2006/main">
+  <p:cSld>
+    <p:spTree>
+      <p:nvGrpSpPr>
+        <p:cNvPr id="1" name=""/>
+        <p:cNvGrpSpPr/>
+        <p:nvPr/>
+      </p:nvGrpSpPr>
+      <p:grpSpPr>
+        <a:xfrm>
+          <a:off x="0" y="0"/>
+          <a:ext cx="0" cy="0"/>
+          <a:chOff x="0" y="0"/>
+          <a:chExt cx="0" cy="0"/>
+        </a:xfrm>
+      </p:grpSpPr>
+      <p:sp>
+        <p:nvSpPr>
+          <p:cNvPr id="2" name="Titel 1"/>
+          <p:cNvSpPr>
+            <a:spLocks noGrp="1"/>
+          </p:cNvSpPr>
+          <p:nvPr>
+            <p:ph type="title"/>
+          </p:nvPr>
+        </p:nvSpPr>
+        <p:spPr/>
+        <p:txBody>
+          <a:bodyPr>
+            <a:normAutofit/>
+          </a:bodyPr>
+          <a:lstStyle/>
+          <a:p>
+            <a:pPr algn="ctr"/>
+            <a:r>
+              <a:rPr lang="en-GB" sz="4800" dirty="0" smtClean="0"/>
+              <a:t>S.W.O.T. ANALYSE</a:t>
+            </a:r>
+            <a:endParaRPr lang="en-GB" sz="4800" dirty="0"/>
+          </a:p>
+        </p:txBody>
+      </p:sp>
+      <p:sp>
+        <p:nvSpPr>
+          <p:cNvPr id="3" name="Pladsholder til indhold 2"/>
+          <p:cNvSpPr>
+            <a:spLocks noGrp="1"/>
+          </p:cNvSpPr>
+          <p:nvPr>
+            <p:ph idx="1"/>
+          </p:nvPr>
+        </p:nvSpPr>
+        <p:spPr/>
+        <p:txBody>
+          <a:bodyPr/>
+          <a:lstStyle/>
+          <a:p>
+            <a:r>
+              <a:rPr lang="en-GB" u="sng" dirty="0" smtClean="0"/>
+              <a:t>S</a:t>
+            </a:r>
+            <a:r>
+              <a:rPr lang="en-GB" dirty="0" smtClean="0"/>
+              <a:t>trengths</a:t>
+            </a:r>
+          </a:p>
+          <a:p>
+            <a:r>
+              <a:rPr lang="en-GB" u="sng" dirty="0" smtClean="0"/>
+              <a:t>W</a:t>
+            </a:r>
+            <a:r>
+              <a:rPr lang="en-GB" dirty="0" smtClean="0"/>
+              <a:t>eaknesses</a:t>
+            </a:r>
+          </a:p>
+          <a:p>
+            <a:r>
+              <a:rPr lang="en-GB" u="sng" dirty="0" smtClean="0"/>
+              <a:t>O</a:t>
+            </a:r>
+            <a:r>
+              <a:rPr lang="en-GB" dirty="0" smtClean="0"/>
+              <a:t>pportunities</a:t>
+            </a:r>
+          </a:p>
+          <a:p>
+            <a:r>
+              <a:rPr lang="en-GB" u="sng" dirty="0" smtClean="0"/>
+              <a:t>T</a:t>
+            </a:r>
+            <a:r>
+              <a:rPr lang="en-GB" dirty="0" smtClean="0"/>
+              <a:t>hreats</a:t>
+            </a:r>
+            <a:endParaRPr lang="en-GB" u="sng" dirty="0"/>
+          </a:p>
+        </p:txBody>
+      </p:sp>
+    </p:spTree>
+    <p:extLst>
+      <p:ext uri="{BB962C8B-B14F-4D97-AF65-F5344CB8AC3E}">
+        <p14:creationId xmlns:p14="http://schemas.microsoft.com/office/powerpoint/2010/main" val="370095492"/>
+      </p:ext>
+    </p:extLst>
+  </p:cSld>
+  <p:clrMapOvr>
+    <a:masterClrMapping/>
+  </p:clrMapOvr>
+  <p:timing>
+    <p:tnLst>
+      <p:par>
+        <p:cTn id="1" dur="indefinite" restart="never" nodeType="tmRoot"/>
+      </p:par>
+    </p:tnLst>
+  </p:timing>
+</p:sld>
+</file>
+
+<file path=ppt/slides/slide4.xml><?xml version="1.0" encoding="utf-8"?>
+<p:sld xmlns:a="http://schemas.openxmlformats.org/drawingml/2006/main" xmlns:r="http://schemas.openxmlformats.org/officeDocument/2006/relationships" xmlns:p="http://schemas.openxmlformats.org/presentationml/2006/main">
+  <p:cSld>
+    <p:spTree>
+      <p:nvGrpSpPr>
+        <p:cNvPr id="1" name=""/>
+        <p:cNvGrpSpPr/>
+        <p:nvPr/>
+      </p:nvGrpSpPr>
+      <p:grpSpPr>
+        <a:xfrm>
+          <a:off x="0" y="0"/>
+          <a:ext cx="0" cy="0"/>
+          <a:chOff x="0" y="0"/>
+          <a:chExt cx="0" cy="0"/>
+        </a:xfrm>
+      </p:grpSpPr>
+      <p:sp>
+        <p:nvSpPr>
+          <p:cNvPr id="2" name="Titel 1"/>
+          <p:cNvSpPr>
+            <a:spLocks noGrp="1"/>
+          </p:cNvSpPr>
+          <p:nvPr>
+            <p:ph type="title"/>
+          </p:nvPr>
+        </p:nvSpPr>
+        <p:spPr/>
+        <p:txBody>
+          <a:bodyPr>
+            <a:normAutofit/>
+          </a:bodyPr>
+          <a:lstStyle/>
+          <a:p>
+            <a:pPr algn="ctr"/>
+            <a:r>
+              <a:rPr lang="en-GB" sz="4800" dirty="0" smtClean="0"/>
+              <a:t>Strengths</a:t>
+            </a:r>
+            <a:endParaRPr lang="en-GB" sz="4800" dirty="0"/>
+          </a:p>
+        </p:txBody>
+      </p:sp>
+      <p:sp>
+        <p:nvSpPr>
+          <p:cNvPr id="3" name="Pladsholder til indhold 2"/>
+          <p:cNvSpPr>
+            <a:spLocks noGrp="1"/>
+          </p:cNvSpPr>
+          <p:nvPr>
+            <p:ph idx="1"/>
+          </p:nvPr>
+        </p:nvSpPr>
+        <p:spPr/>
+        <p:txBody>
+          <a:bodyPr/>
+          <a:lstStyle/>
+          <a:p>
+            <a:r>
+              <a:rPr lang="en-GB" dirty="0" err="1" smtClean="0"/>
+              <a:t>Stigende</a:t>
+            </a:r>
+            <a:r>
+              <a:rPr lang="en-GB" dirty="0" smtClean="0"/>
+              <a:t> </a:t>
+            </a:r>
+            <a:r>
+              <a:rPr lang="en-GB" dirty="0" err="1" smtClean="0"/>
+              <a:t>antal</a:t>
+            </a:r>
+            <a:r>
+              <a:rPr lang="en-GB" dirty="0" smtClean="0"/>
+              <a:t> </a:t>
+            </a:r>
+            <a:r>
+              <a:rPr lang="en-GB" dirty="0" err="1" smtClean="0"/>
+              <a:t>kunder</a:t>
+            </a:r>
+            <a:endParaRPr lang="en-GB" dirty="0" smtClean="0"/>
+          </a:p>
+          <a:p>
+            <a:r>
+              <a:rPr lang="en-GB" dirty="0" err="1" smtClean="0"/>
+              <a:t>Klare</a:t>
+            </a:r>
+            <a:r>
+              <a:rPr lang="en-GB" dirty="0" smtClean="0"/>
+              <a:t> </a:t>
+            </a:r>
+            <a:r>
+              <a:rPr lang="en-GB" dirty="0" err="1" smtClean="0"/>
+              <a:t>mål</a:t>
+            </a:r>
+            <a:r>
+              <a:rPr lang="en-GB" dirty="0" smtClean="0"/>
+              <a:t> </a:t>
+            </a:r>
+            <a:r>
+              <a:rPr lang="en-GB" dirty="0" err="1" smtClean="0"/>
+              <a:t>og</a:t>
+            </a:r>
+            <a:r>
+              <a:rPr lang="en-GB" dirty="0" smtClean="0"/>
+              <a:t> planer</a:t>
+            </a:r>
+          </a:p>
+        </p:txBody>
+      </p:sp>
+    </p:spTree>
+    <p:extLst>
+      <p:ext uri="{BB962C8B-B14F-4D97-AF65-F5344CB8AC3E}">
+        <p14:creationId xmlns:p14="http://schemas.microsoft.com/office/powerpoint/2010/main" val="2681540899"/>
+      </p:ext>
+    </p:extLst>
+  </p:cSld>
+  <p:clrMapOvr>
+    <a:masterClrMapping/>
+  </p:clrMapOvr>
+  <p:timing>
+    <p:tnLst>
+      <p:par>
+        <p:cTn id="1" dur="indefinite" restart="never" nodeType="tmRoot"/>
+      </p:par>
+    </p:tnLst>
+  </p:timing>
+</p:sld>
+</file>
+
+<file path=ppt/slides/slide5.xml><?xml version="1.0" encoding="utf-8"?>
+<p:sld xmlns:a="http://schemas.openxmlformats.org/drawingml/2006/main" xmlns:r="http://schemas.openxmlformats.org/officeDocument/2006/relationships" xmlns:p="http://schemas.openxmlformats.org/presentationml/2006/main">
+  <p:cSld>
+    <p:spTree>
+      <p:nvGrpSpPr>
+        <p:cNvPr id="1" name=""/>
+        <p:cNvGrpSpPr/>
+        <p:nvPr/>
+      </p:nvGrpSpPr>
+      <p:grpSpPr>
+        <a:xfrm>
+          <a:off x="0" y="0"/>
+          <a:ext cx="0" cy="0"/>
+          <a:chOff x="0" y="0"/>
+          <a:chExt cx="0" cy="0"/>
+        </a:xfrm>
+      </p:grpSpPr>
+      <p:sp>
+        <p:nvSpPr>
+          <p:cNvPr id="2" name="Titel 1"/>
+          <p:cNvSpPr>
+            <a:spLocks noGrp="1"/>
+          </p:cNvSpPr>
+          <p:nvPr>
+            <p:ph type="title"/>
+          </p:nvPr>
+        </p:nvSpPr>
+        <p:spPr/>
+        <p:txBody>
+          <a:bodyPr>
+            <a:normAutofit/>
+          </a:bodyPr>
+          <a:lstStyle/>
+          <a:p>
+            <a:pPr algn="ctr"/>
+            <a:r>
+              <a:rPr lang="en-GB" sz="4800" dirty="0" smtClean="0"/>
+              <a:t>Weaknesses</a:t>
+            </a:r>
+            <a:endParaRPr lang="en-GB" sz="4800" dirty="0"/>
+          </a:p>
+        </p:txBody>
+      </p:sp>
+      <p:sp>
+        <p:nvSpPr>
+          <p:cNvPr id="3" name="Pladsholder til indhold 2"/>
+          <p:cNvSpPr>
+            <a:spLocks noGrp="1"/>
+          </p:cNvSpPr>
+          <p:nvPr>
+            <p:ph idx="1"/>
+          </p:nvPr>
+        </p:nvSpPr>
+        <p:spPr/>
+        <p:txBody>
+          <a:bodyPr/>
+          <a:lstStyle/>
+          <a:p>
+            <a:r>
+              <a:rPr lang="en-GB" dirty="0" err="1" smtClean="0"/>
+              <a:t>Mangel</a:t>
+            </a:r>
+            <a:r>
+              <a:rPr lang="en-GB" dirty="0" smtClean="0"/>
+              <a:t> </a:t>
+            </a:r>
+            <a:r>
+              <a:rPr lang="en-GB" dirty="0" err="1" smtClean="0"/>
+              <a:t>på</a:t>
+            </a:r>
+            <a:r>
+              <a:rPr lang="en-GB" dirty="0" smtClean="0"/>
+              <a:t> IT-system</a:t>
+            </a:r>
+          </a:p>
+          <a:p>
+            <a:r>
+              <a:rPr lang="en-GB" dirty="0" err="1" smtClean="0"/>
+              <a:t>Dårlig</a:t>
+            </a:r>
+            <a:r>
+              <a:rPr lang="en-GB" dirty="0" smtClean="0"/>
+              <a:t> organisation </a:t>
+            </a:r>
+            <a:r>
+              <a:rPr lang="en-GB" dirty="0" err="1" smtClean="0"/>
+              <a:t>og</a:t>
+            </a:r>
+            <a:r>
+              <a:rPr lang="en-GB" dirty="0" smtClean="0"/>
+              <a:t> </a:t>
+            </a:r>
+            <a:r>
+              <a:rPr lang="en-GB" dirty="0" err="1" smtClean="0"/>
+              <a:t>overblik</a:t>
+            </a:r>
+            <a:r>
+              <a:rPr lang="en-GB" dirty="0" smtClean="0"/>
+              <a:t>.</a:t>
+            </a:r>
+            <a:endParaRPr lang="en-GB" dirty="0"/>
+          </a:p>
+        </p:txBody>
+      </p:sp>
+    </p:spTree>
+    <p:extLst>
+      <p:ext uri="{BB962C8B-B14F-4D97-AF65-F5344CB8AC3E}">
+        <p14:creationId xmlns:p14="http://schemas.microsoft.com/office/powerpoint/2010/main" val="1464728425"/>
+      </p:ext>
+    </p:extLst>
+  </p:cSld>
+  <p:clrMapOvr>
+    <a:masterClrMapping/>
+  </p:clrMapOvr>
+  <p:timing>
+    <p:tnLst>
+      <p:par>
+        <p:cTn id="1" dur="indefinite" restart="never" nodeType="tmRoot"/>
+      </p:par>
+    </p:tnLst>
+  </p:timing>
+</p:sld>
+</file>
+
+<file path=ppt/slides/slide6.xml><?xml version="1.0" encoding="utf-8"?>
+<p:sld xmlns:a="http://schemas.openxmlformats.org/drawingml/2006/main" xmlns:r="http://schemas.openxmlformats.org/officeDocument/2006/relationships" xmlns:p="http://schemas.openxmlformats.org/presentationml/2006/main">
+  <p:cSld>
+    <p:spTree>
+      <p:nvGrpSpPr>
+        <p:cNvPr id="1" name=""/>
+        <p:cNvGrpSpPr/>
+        <p:nvPr/>
+      </p:nvGrpSpPr>
+      <p:grpSpPr>
+        <a:xfrm>
+          <a:off x="0" y="0"/>
+          <a:ext cx="0" cy="0"/>
+          <a:chOff x="0" y="0"/>
+          <a:chExt cx="0" cy="0"/>
+        </a:xfrm>
+      </p:grpSpPr>
+      <p:sp>
+        <p:nvSpPr>
+          <p:cNvPr id="2" name="Titel 1"/>
+          <p:cNvSpPr>
+            <a:spLocks noGrp="1"/>
+          </p:cNvSpPr>
+          <p:nvPr>
+            <p:ph type="title"/>
+          </p:nvPr>
+        </p:nvSpPr>
+        <p:spPr/>
+        <p:txBody>
+          <a:bodyPr>
+            <a:normAutofit/>
+          </a:bodyPr>
+          <a:lstStyle/>
+          <a:p>
+            <a:pPr algn="ctr"/>
+            <a:r>
+              <a:rPr lang="en-GB" sz="4800" dirty="0" smtClean="0"/>
+              <a:t>Opportunities</a:t>
+            </a:r>
+            <a:endParaRPr lang="en-GB" sz="4800" dirty="0"/>
+          </a:p>
+        </p:txBody>
+      </p:sp>
+      <p:sp>
+        <p:nvSpPr>
+          <p:cNvPr id="3" name="Pladsholder til indhold 2"/>
+          <p:cNvSpPr>
+            <a:spLocks noGrp="1"/>
+          </p:cNvSpPr>
+          <p:nvPr>
+            <p:ph idx="1"/>
+          </p:nvPr>
+        </p:nvSpPr>
+        <p:spPr/>
+        <p:txBody>
+          <a:bodyPr/>
+          <a:lstStyle/>
+          <a:p>
+            <a:r>
+              <a:rPr lang="en-GB" dirty="0" err="1" smtClean="0"/>
+              <a:t>Stigende</a:t>
+            </a:r>
+            <a:r>
+              <a:rPr lang="en-GB" dirty="0" smtClean="0"/>
+              <a:t> </a:t>
+            </a:r>
+            <a:r>
+              <a:rPr lang="en-GB" dirty="0" err="1" smtClean="0"/>
+              <a:t>antal</a:t>
+            </a:r>
+            <a:r>
+              <a:rPr lang="en-GB" dirty="0" smtClean="0"/>
+              <a:t> </a:t>
+            </a:r>
+            <a:r>
+              <a:rPr lang="en-GB" dirty="0" err="1" smtClean="0"/>
+              <a:t>kunder</a:t>
+            </a:r>
+            <a:r>
+              <a:rPr lang="en-GB" dirty="0" smtClean="0"/>
+              <a:t> = </a:t>
+            </a:r>
+            <a:r>
+              <a:rPr lang="en-GB" dirty="0" err="1" smtClean="0"/>
+              <a:t>bedre</a:t>
+            </a:r>
+            <a:r>
+              <a:rPr lang="en-GB" dirty="0" smtClean="0"/>
+              <a:t> </a:t>
+            </a:r>
+            <a:r>
+              <a:rPr lang="en-GB" dirty="0" err="1" smtClean="0"/>
+              <a:t>købekraft</a:t>
+            </a:r>
+            <a:r>
+              <a:rPr lang="en-GB" dirty="0" smtClean="0"/>
+              <a:t> (</a:t>
+            </a:r>
+            <a:r>
+              <a:rPr lang="en-GB" dirty="0" err="1" smtClean="0"/>
+              <a:t>nyt</a:t>
+            </a:r>
+            <a:r>
+              <a:rPr lang="en-GB" dirty="0" smtClean="0"/>
+              <a:t> IT-system)</a:t>
+            </a:r>
+            <a:endParaRPr lang="en-GB" dirty="0"/>
+          </a:p>
+        </p:txBody>
+      </p:sp>
+    </p:spTree>
+    <p:extLst>
+      <p:ext uri="{BB962C8B-B14F-4D97-AF65-F5344CB8AC3E}">
+        <p14:creationId xmlns:p14="http://schemas.microsoft.com/office/powerpoint/2010/main" val="1292349113"/>
+      </p:ext>
+    </p:extLst>
+  </p:cSld>
+  <p:clrMapOvr>
+    <a:masterClrMapping/>
+  </p:clrMapOvr>
+  <p:timing>
+    <p:tnLst>
+      <p:par>
+        <p:cTn id="1" dur="indefinite" restart="never" nodeType="tmRoot"/>
+      </p:par>
+    </p:tnLst>
+  </p:timing>
+</p:sld>
+</file>
+
+<file path=ppt/slides/slide7.xml><?xml version="1.0" encoding="utf-8"?>
+<p:sld xmlns:a="http://schemas.openxmlformats.org/drawingml/2006/main" xmlns:r="http://schemas.openxmlformats.org/officeDocument/2006/relationships" xmlns:p="http://schemas.openxmlformats.org/presentationml/2006/main">
+  <p:cSld>
+    <p:spTree>
+      <p:nvGrpSpPr>
+        <p:cNvPr id="1" name=""/>
+        <p:cNvGrpSpPr/>
+        <p:nvPr/>
+      </p:nvGrpSpPr>
+      <p:grpSpPr>
+        <a:xfrm>
+          <a:off x="0" y="0"/>
+          <a:ext cx="0" cy="0"/>
+          <a:chOff x="0" y="0"/>
+          <a:chExt cx="0" cy="0"/>
+        </a:xfrm>
+      </p:grpSpPr>
+      <p:sp>
+        <p:nvSpPr>
+          <p:cNvPr id="2" name="Titel 1"/>
+          <p:cNvSpPr>
+            <a:spLocks noGrp="1"/>
+          </p:cNvSpPr>
+          <p:nvPr>
+            <p:ph type="title"/>
+          </p:nvPr>
+        </p:nvSpPr>
+        <p:spPr/>
+        <p:txBody>
+          <a:bodyPr>
+            <a:normAutofit/>
+          </a:bodyPr>
+          <a:lstStyle/>
+          <a:p>
+            <a:pPr algn="ctr"/>
+            <a:r>
+              <a:rPr lang="en-GB" sz="4800" dirty="0" smtClean="0"/>
+              <a:t>THREATS</a:t>
+            </a:r>
+            <a:endParaRPr lang="en-GB" sz="4800" dirty="0"/>
+          </a:p>
+        </p:txBody>
+      </p:sp>
+      <p:sp>
+        <p:nvSpPr>
+          <p:cNvPr id="3" name="Pladsholder til indhold 2"/>
+          <p:cNvSpPr>
+            <a:spLocks noGrp="1"/>
+          </p:cNvSpPr>
+          <p:nvPr>
+            <p:ph idx="1"/>
+          </p:nvPr>
+        </p:nvSpPr>
+        <p:spPr/>
+        <p:txBody>
+          <a:bodyPr/>
+          <a:lstStyle/>
+          <a:p>
+            <a:r>
+              <a:rPr lang="en-GB" dirty="0" err="1" smtClean="0"/>
+              <a:t>Svømningpupolariteten</a:t>
+            </a:r>
+            <a:endParaRPr lang="en-GB" dirty="0"/>
+          </a:p>
+          <a:p>
+            <a:r>
+              <a:rPr lang="en-GB" dirty="0" err="1" smtClean="0"/>
+              <a:t>Nyt</a:t>
+            </a:r>
+            <a:r>
+              <a:rPr lang="en-GB" dirty="0" smtClean="0"/>
+              <a:t> IT-System = </a:t>
+            </a:r>
+            <a:r>
+              <a:rPr lang="en-GB" dirty="0" err="1" smtClean="0"/>
+              <a:t>uventede</a:t>
+            </a:r>
+            <a:r>
+              <a:rPr lang="en-GB" dirty="0" smtClean="0"/>
+              <a:t> </a:t>
+            </a:r>
+            <a:r>
+              <a:rPr lang="en-GB" dirty="0" err="1" smtClean="0"/>
+              <a:t>problemer</a:t>
+            </a:r>
+            <a:endParaRPr lang="en-GB" dirty="0"/>
+          </a:p>
+        </p:txBody>
+      </p:sp>
+    </p:spTree>
+    <p:extLst>
+      <p:ext uri="{BB962C8B-B14F-4D97-AF65-F5344CB8AC3E}">
+        <p14:creationId xmlns:p14="http://schemas.microsoft.com/office/powerpoint/2010/main" val="2090565885"/>
+      </p:ext>
+    </p:extLst>
+  </p:cSld>
+  <p:clrMapOvr>
+    <a:masterClrMapping/>
+  </p:clrMapOvr>
+  <p:timing>
+    <p:tnLst>
+      <p:par>
+        <p:cTn id="1" dur="indefinite" restart="never" nodeType="tmRoot"/>
+      </p:par>
+    </p:tnLst>
+  </p:timing>
+</p:sld>
+</file>
+
+<file path=ppt/slides/slide8.xml><?xml version="1.0" encoding="utf-8"?>
+<p:sld xmlns:a="http://schemas.openxmlformats.org/drawingml/2006/main" xmlns:r="http://schemas.openxmlformats.org/officeDocument/2006/relationships" xmlns:p="http://schemas.openxmlformats.org/presentationml/2006/main">
+  <p:cSld>
+    <p:spTree>
+      <p:nvGrpSpPr>
+        <p:cNvPr id="1" name=""/>
+        <p:cNvGrpSpPr/>
+        <p:nvPr/>
+      </p:nvGrpSpPr>
+      <p:grpSpPr>
+        <a:xfrm>
+          <a:off x="0" y="0"/>
+          <a:ext cx="0" cy="0"/>
+          <a:chOff x="0" y="0"/>
+          <a:chExt cx="0" cy="0"/>
+        </a:xfrm>
+      </p:grpSpPr>
+      <p:sp>
+        <p:nvSpPr>
+          <p:cNvPr id="2" name="Titel 1"/>
+          <p:cNvSpPr>
+            <a:spLocks noGrp="1"/>
+          </p:cNvSpPr>
+          <p:nvPr>
+            <p:ph type="title"/>
+          </p:nvPr>
+        </p:nvSpPr>
+        <p:spPr/>
+        <p:txBody>
+          <a:bodyPr>
+            <a:normAutofit/>
+          </a:bodyPr>
+          <a:lstStyle/>
+          <a:p>
+            <a:pPr algn="ctr"/>
+            <a:r>
+              <a:rPr lang="en-GB" sz="4800" dirty="0" err="1" smtClean="0"/>
+              <a:t>Virksomhedsbeskrivelse</a:t>
+            </a:r>
+            <a:endParaRPr lang="en-GB" sz="4800" dirty="0"/>
+          </a:p>
+        </p:txBody>
+      </p:sp>
+      <p:sp>
+        <p:nvSpPr>
+          <p:cNvPr id="3" name="Pladsholder til indhold 2"/>
+          <p:cNvSpPr>
+            <a:spLocks noGrp="1"/>
+          </p:cNvSpPr>
+          <p:nvPr>
+            <p:ph idx="1"/>
+          </p:nvPr>
+        </p:nvSpPr>
+        <p:spPr/>
+        <p:txBody>
+          <a:bodyPr/>
+          <a:lstStyle/>
+          <a:p>
+            <a:r>
+              <a:rPr lang="en-GB" dirty="0" err="1" smtClean="0"/>
+              <a:t>Forretningsgrundlag</a:t>
+            </a:r>
+            <a:endParaRPr lang="en-GB" dirty="0" smtClean="0"/>
+          </a:p>
+          <a:p>
+            <a:r>
+              <a:rPr lang="en-GB" dirty="0" smtClean="0"/>
+              <a:t>Mission</a:t>
+            </a:r>
+          </a:p>
+          <a:p>
+            <a:r>
+              <a:rPr lang="en-GB" dirty="0" smtClean="0"/>
+              <a:t>Vision</a:t>
+            </a:r>
+            <a:endParaRPr lang="en-GB" dirty="0"/>
+          </a:p>
+        </p:txBody>
+      </p:sp>
+    </p:spTree>
+    <p:extLst>
+      <p:ext uri="{BB962C8B-B14F-4D97-AF65-F5344CB8AC3E}">
+        <p14:creationId xmlns:p14="http://schemas.microsoft.com/office/powerpoint/2010/main" val="1052928876"/>
+      </p:ext>
+    </p:extLst>
+  </p:cSld>
+  <p:clrMapOvr>
+    <a:masterClrMapping/>
+  </p:clrMapOvr>
+  <p:timing>
+    <p:tnLst>
+      <p:par>
+        <p:cTn id="1" dur="indefinite" restart="never" nodeType="tmRoot"/>
+      </p:par>
+    </p:tnLst>
+  </p:timing>
+</p:sld>
+</file>
+
+<file path=ppt/slides/slide9.xml><?xml version="1.0" encoding="utf-8"?>
+<p:sld xmlns:a="http://schemas.openxmlformats.org/drawingml/2006/main" xmlns:r="http://schemas.openxmlformats.org/officeDocument/2006/relationships" xmlns:p="http://schemas.openxmlformats.org/presentationml/2006/main">
+  <p:cSld>
+    <p:spTree>
+      <p:nvGrpSpPr>
+        <p:cNvPr id="1" name=""/>
+        <p:cNvGrpSpPr/>
+        <p:nvPr/>
+      </p:nvGrpSpPr>
+      <p:grpSpPr>
+        <a:xfrm>
+          <a:off x="0" y="0"/>
+          <a:ext cx="0" cy="0"/>
+          <a:chOff x="0" y="0"/>
+          <a:chExt cx="0" cy="0"/>
+        </a:xfrm>
+      </p:grpSpPr>
+      <p:sp>
+        <p:nvSpPr>
+          <p:cNvPr id="2" name="Titel 1"/>
+          <p:cNvSpPr>
+            <a:spLocks noGrp="1"/>
+          </p:cNvSpPr>
+          <p:nvPr>
+            <p:ph type="title"/>
+          </p:nvPr>
+        </p:nvSpPr>
+        <p:spPr/>
+        <p:txBody>
+          <a:bodyPr>
+            <a:normAutofit/>
+          </a:bodyPr>
+          <a:lstStyle/>
+          <a:p>
+            <a:pPr algn="ctr"/>
+            <a:r>
+              <a:rPr lang="en-GB" sz="4800" dirty="0" smtClean="0"/>
+              <a:t>SWD</a:t>
+            </a:r>
+            <a:endParaRPr lang="en-GB" sz="4800" dirty="0"/>
+          </a:p>
+        </p:txBody>
+      </p:sp>
+      <p:sp>
+        <p:nvSpPr>
+          <p:cNvPr id="3" name="Pladsholder til indhold 2"/>
+          <p:cNvSpPr>
+            <a:spLocks noGrp="1"/>
+          </p:cNvSpPr>
+          <p:nvPr>
+            <p:ph idx="1"/>
+          </p:nvPr>
+        </p:nvSpPr>
+        <p:spPr/>
+        <p:txBody>
+          <a:bodyPr/>
+          <a:lstStyle/>
+          <a:p>
+            <a:r>
+              <a:rPr lang="en-GB" dirty="0" smtClean="0"/>
+              <a:t>Use-cases</a:t>
+            </a:r>
+          </a:p>
+          <a:p>
+            <a:r>
+              <a:rPr lang="en-GB" dirty="0" smtClean="0"/>
+              <a:t>Sequence Diagrams</a:t>
+            </a:r>
+          </a:p>
+          <a:p>
+            <a:endParaRPr lang="en-GB" dirty="0"/>
+          </a:p>
+        </p:txBody>
+      </p:sp>
+    </p:spTree>
+    <p:extLst>
+      <p:ext uri="{BB962C8B-B14F-4D97-AF65-F5344CB8AC3E}">
+        <p14:creationId xmlns:p14="http://schemas.microsoft.com/office/powerpoint/2010/main" val="1576237368"/>
+      </p:ext>
+    </p:extLst>
+  </p:cSld>
+  <p:clrMapOvr>
+    <a:masterClrMapping/>
+  </p:clrMapOvr>
+  <p:timing>
+    <p:tnLst>
+      <p:par>
+        <p:cTn id="1" dur="indefinite" restart="never" nodeType="tmRoot"/>
+      </p:par>
+    </p:tnLst>
+  </p:timing>
 </p:sld>
 </file>
 

</xml_diff>

<commit_message>
Updated .ppt and deleted Hans Hansen (via the program)
</commit_message>
<xml_diff>
--- a/Report/Svømmehallen fremlæggelse.pptx
+++ b/Report/Svømmehallen fremlæggelse.pptx
@@ -15,10 +15,11 @@
     <p:sldId id="263" r:id="rId9"/>
     <p:sldId id="264" r:id="rId10"/>
     <p:sldId id="265" r:id="rId11"/>
-    <p:sldId id="266" r:id="rId12"/>
-    <p:sldId id="267" r:id="rId13"/>
-    <p:sldId id="268" r:id="rId14"/>
-    <p:sldId id="269" r:id="rId15"/>
+    <p:sldId id="270" r:id="rId12"/>
+    <p:sldId id="266" r:id="rId13"/>
+    <p:sldId id="267" r:id="rId14"/>
+    <p:sldId id="268" r:id="rId15"/>
+    <p:sldId id="269" r:id="rId16"/>
   </p:sldIdLst>
   <p:sldSz cx="12192000" cy="6858000"/>
   <p:notesSz cx="6858000" cy="9144000"/>
@@ -5666,25 +5667,6 @@
           </a:p>
         </p:txBody>
       </p:sp>
-      <p:sp>
-        <p:nvSpPr>
-          <p:cNvPr id="3" name="Undertitel 2"/>
-          <p:cNvSpPr>
-            <a:spLocks noGrp="1"/>
-          </p:cNvSpPr>
-          <p:nvPr>
-            <p:ph type="subTitle" idx="1"/>
-          </p:nvPr>
-        </p:nvSpPr>
-        <p:spPr/>
-        <p:txBody>
-          <a:bodyPr/>
-          <a:lstStyle/>
-          <a:p>
-            <a:endParaRPr lang="en-GB" dirty="0"/>
-          </a:p>
-        </p:txBody>
-      </p:sp>
     </p:spTree>
     <p:extLst>
       <p:ext uri="{BB962C8B-B14F-4D97-AF65-F5344CB8AC3E}">
@@ -5870,35 +5852,9 @@
           <a:chExt cx="0" cy="0"/>
         </a:xfrm>
       </p:grpSpPr>
-      <p:sp>
-        <p:nvSpPr>
-          <p:cNvPr id="2" name="Titel 1"/>
-          <p:cNvSpPr>
-            <a:spLocks noGrp="1"/>
-          </p:cNvSpPr>
-          <p:nvPr>
-            <p:ph type="title"/>
-          </p:nvPr>
-        </p:nvSpPr>
-        <p:spPr/>
-        <p:txBody>
-          <a:bodyPr>
-            <a:normAutofit/>
-          </a:bodyPr>
-          <a:lstStyle/>
-          <a:p>
-            <a:pPr algn="ctr"/>
-            <a:r>
-              <a:rPr lang="en-GB" sz="4800" dirty="0" smtClean="0"/>
-              <a:t>Sequence diagrams</a:t>
-            </a:r>
-            <a:endParaRPr lang="en-GB" sz="4800" dirty="0"/>
-          </a:p>
-        </p:txBody>
-      </p:sp>
       <p:pic>
         <p:nvPicPr>
-          <p:cNvPr id="3" name="Billede 2" descr="C:\Users\soren\Desktop\GitHub\ExamFirstSem\Dolphin\Diagrams\Lav nyt medlem SSD.jpg"/>
+          <p:cNvPr id="2" name="Billede 1"/>
           <p:cNvPicPr/>
           <p:nvPr/>
         </p:nvPicPr>
@@ -5910,81 +5866,14 @@
               </a:ext>
             </a:extLst>
           </a:blip>
-          <a:srcRect/>
           <a:stretch>
             <a:fillRect/>
           </a:stretch>
         </p:blipFill>
         <p:spPr bwMode="auto">
           <a:xfrm>
-            <a:off x="0" y="2691227"/>
-            <a:ext cx="4343400" cy="4046220"/>
-          </a:xfrm>
-          <a:prstGeom prst="rect">
-            <a:avLst/>
-          </a:prstGeom>
-          <a:noFill/>
-          <a:ln>
-            <a:noFill/>
-          </a:ln>
-        </p:spPr>
-      </p:pic>
-      <p:pic>
-        <p:nvPicPr>
-          <p:cNvPr id="4" name="Billede 3" descr="Kasserer vælger overblik over kunder i restance funktionen2"/>
-          <p:cNvPicPr/>
-          <p:nvPr/>
-        </p:nvPicPr>
-        <p:blipFill>
-          <a:blip r:embed="rId3">
-            <a:extLst>
-              <a:ext uri="{28A0092B-C50C-407E-A947-70E740481C1C}">
-                <a14:useLocalDpi xmlns:a14="http://schemas.microsoft.com/office/drawing/2010/main" val="0"/>
-              </a:ext>
-            </a:extLst>
-          </a:blip>
-          <a:srcRect/>
-          <a:stretch>
-            <a:fillRect/>
-          </a:stretch>
-        </p:blipFill>
-        <p:spPr bwMode="auto">
-          <a:xfrm>
-            <a:off x="4343400" y="2192117"/>
-            <a:ext cx="5013960" cy="2522220"/>
-          </a:xfrm>
-          <a:prstGeom prst="rect">
-            <a:avLst/>
-          </a:prstGeom>
-          <a:noFill/>
-          <a:ln>
-            <a:noFill/>
-          </a:ln>
-        </p:spPr>
-      </p:pic>
-      <p:pic>
-        <p:nvPicPr>
-          <p:cNvPr id="5" name="Billede 4" descr="C:\Users\soren\Desktop\GitHub\ExamFirstSem\Dolphin\Diagrams\Bedste svømmertider SSD.jpg"/>
-          <p:cNvPicPr/>
-          <p:nvPr/>
-        </p:nvPicPr>
-        <p:blipFill>
-          <a:blip r:embed="rId4">
-            <a:extLst>
-              <a:ext uri="{28A0092B-C50C-407E-A947-70E740481C1C}">
-                <a14:useLocalDpi xmlns:a14="http://schemas.microsoft.com/office/drawing/2010/main" val="0"/>
-              </a:ext>
-            </a:extLst>
-          </a:blip>
-          <a:srcRect/>
-          <a:stretch>
-            <a:fillRect/>
-          </a:stretch>
-        </p:blipFill>
-        <p:spPr bwMode="auto">
-          <a:xfrm>
-            <a:off x="8099282" y="4012231"/>
-            <a:ext cx="3567430" cy="2559050"/>
+            <a:off x="439946" y="181154"/>
+            <a:ext cx="11317857" cy="6599208"/>
           </a:xfrm>
           <a:prstGeom prst="rect">
             <a:avLst/>
@@ -5998,7 +5887,7 @@
     </p:spTree>
     <p:extLst>
       <p:ext uri="{BB962C8B-B14F-4D97-AF65-F5344CB8AC3E}">
-        <p14:creationId xmlns:p14="http://schemas.microsoft.com/office/powerpoint/2010/main" val="3194657663"/>
+        <p14:creationId xmlns:p14="http://schemas.microsoft.com/office/powerpoint/2010/main" val="2352407171"/>
       </p:ext>
     </p:extLst>
   </p:cSld>
@@ -6051,55 +5940,87 @@
           <a:p>
             <a:pPr algn="ctr"/>
             <a:r>
+              <a:rPr lang="en-GB" sz="4800" smtClean="0"/>
+              <a:t>System Sequence </a:t>
+            </a:r>
+            <a:r>
               <a:rPr lang="en-GB" sz="4800" dirty="0" smtClean="0"/>
-              <a:t>SWC</a:t>
+              <a:t>diagrams</a:t>
             </a:r>
             <a:endParaRPr lang="en-GB" sz="4800" dirty="0"/>
           </a:p>
         </p:txBody>
       </p:sp>
-      <p:sp>
-        <p:nvSpPr>
-          <p:cNvPr id="3" name="Pladsholder til indhold 2"/>
-          <p:cNvSpPr>
-            <a:spLocks noGrp="1"/>
-          </p:cNvSpPr>
-          <p:nvPr>
-            <p:ph idx="1"/>
-          </p:nvPr>
-        </p:nvSpPr>
-        <p:spPr/>
-        <p:txBody>
-          <a:bodyPr/>
-          <a:lstStyle/>
-          <a:p>
-            <a:r>
-              <a:rPr lang="en-GB" dirty="0" err="1" smtClean="0"/>
-              <a:t>Programmet</a:t>
-            </a:r>
-            <a:endParaRPr lang="en-GB" dirty="0"/>
-          </a:p>
-          <a:p>
-            <a:r>
-              <a:rPr lang="en-GB" dirty="0" err="1" smtClean="0"/>
-              <a:t>Programmets</a:t>
-            </a:r>
-            <a:r>
-              <a:rPr lang="en-GB" dirty="0" smtClean="0"/>
-              <a:t> </a:t>
-            </a:r>
-            <a:r>
-              <a:rPr lang="en-GB" dirty="0" err="1" smtClean="0"/>
-              <a:t>konstruktion</a:t>
-            </a:r>
-            <a:endParaRPr lang="en-GB" dirty="0"/>
-          </a:p>
-        </p:txBody>
-      </p:sp>
+      <p:pic>
+        <p:nvPicPr>
+          <p:cNvPr id="3" name="Billede 2" descr="C:\Users\soren\Desktop\GitHub\ExamFirstSem\Dolphin\Diagrams\Lav nyt medlem SSD.jpg"/>
+          <p:cNvPicPr/>
+          <p:nvPr/>
+        </p:nvPicPr>
+        <p:blipFill>
+          <a:blip r:embed="rId2">
+            <a:extLst>
+              <a:ext uri="{28A0092B-C50C-407E-A947-70E740481C1C}">
+                <a14:useLocalDpi xmlns:a14="http://schemas.microsoft.com/office/drawing/2010/main" val="0"/>
+              </a:ext>
+            </a:extLst>
+          </a:blip>
+          <a:srcRect/>
+          <a:stretch>
+            <a:fillRect/>
+          </a:stretch>
+        </p:blipFill>
+        <p:spPr bwMode="auto">
+          <a:xfrm>
+            <a:off x="624254" y="2514600"/>
+            <a:ext cx="4343400" cy="4046220"/>
+          </a:xfrm>
+          <a:prstGeom prst="rect">
+            <a:avLst/>
+          </a:prstGeom>
+          <a:noFill/>
+          <a:ln>
+            <a:noFill/>
+          </a:ln>
+        </p:spPr>
+      </p:pic>
+      <p:pic>
+        <p:nvPicPr>
+          <p:cNvPr id="4" name="Billede 3" descr="Kasserer vælger overblik over kunder i restance funktionen2"/>
+          <p:cNvPicPr/>
+          <p:nvPr/>
+        </p:nvPicPr>
+        <p:blipFill>
+          <a:blip r:embed="rId3">
+            <a:extLst>
+              <a:ext uri="{28A0092B-C50C-407E-A947-70E740481C1C}">
+                <a14:useLocalDpi xmlns:a14="http://schemas.microsoft.com/office/drawing/2010/main" val="0"/>
+              </a:ext>
+            </a:extLst>
+          </a:blip>
+          <a:srcRect/>
+          <a:stretch>
+            <a:fillRect/>
+          </a:stretch>
+        </p:blipFill>
+        <p:spPr bwMode="auto">
+          <a:xfrm>
+            <a:off x="5760889" y="3033395"/>
+            <a:ext cx="5286522" cy="3008630"/>
+          </a:xfrm>
+          <a:prstGeom prst="rect">
+            <a:avLst/>
+          </a:prstGeom>
+          <a:noFill/>
+          <a:ln>
+            <a:noFill/>
+          </a:ln>
+        </p:spPr>
+      </p:pic>
     </p:spTree>
     <p:extLst>
       <p:ext uri="{BB962C8B-B14F-4D97-AF65-F5344CB8AC3E}">
-        <p14:creationId xmlns:p14="http://schemas.microsoft.com/office/powerpoint/2010/main" val="1345523401"/>
+        <p14:creationId xmlns:p14="http://schemas.microsoft.com/office/powerpoint/2010/main" val="3194657663"/>
       </p:ext>
     </p:extLst>
   </p:cSld>
@@ -6152,29 +6073,111 @@
           <a:p>
             <a:pPr algn="ctr"/>
             <a:r>
+              <a:rPr lang="en-GB" sz="4800" dirty="0" smtClean="0"/>
+              <a:t>SWC</a:t>
+            </a:r>
+            <a:endParaRPr lang="en-GB" sz="4800" dirty="0"/>
+          </a:p>
+        </p:txBody>
+      </p:sp>
+      <p:sp>
+        <p:nvSpPr>
+          <p:cNvPr id="3" name="Pladsholder til indhold 2"/>
+          <p:cNvSpPr>
+            <a:spLocks noGrp="1"/>
+          </p:cNvSpPr>
+          <p:nvPr>
+            <p:ph idx="1"/>
+          </p:nvPr>
+        </p:nvSpPr>
+        <p:spPr/>
+        <p:txBody>
+          <a:bodyPr/>
+          <a:lstStyle/>
+          <a:p>
+            <a:r>
+              <a:rPr lang="en-GB" dirty="0" err="1" smtClean="0"/>
+              <a:t>Programmet</a:t>
+            </a:r>
+            <a:endParaRPr lang="en-GB" dirty="0"/>
+          </a:p>
+          <a:p>
+            <a:r>
+              <a:rPr lang="en-GB" dirty="0" err="1" smtClean="0"/>
+              <a:t>Programmets</a:t>
+            </a:r>
+            <a:r>
+              <a:rPr lang="en-GB" dirty="0" smtClean="0"/>
+              <a:t> </a:t>
+            </a:r>
+            <a:r>
+              <a:rPr lang="en-GB" dirty="0" err="1" smtClean="0"/>
+              <a:t>konstruktion</a:t>
+            </a:r>
+            <a:endParaRPr lang="en-GB" dirty="0"/>
+          </a:p>
+        </p:txBody>
+      </p:sp>
+    </p:spTree>
+    <p:extLst>
+      <p:ext uri="{BB962C8B-B14F-4D97-AF65-F5344CB8AC3E}">
+        <p14:creationId xmlns:p14="http://schemas.microsoft.com/office/powerpoint/2010/main" val="1345523401"/>
+      </p:ext>
+    </p:extLst>
+  </p:cSld>
+  <p:clrMapOvr>
+    <a:masterClrMapping/>
+  </p:clrMapOvr>
+  <p:timing>
+    <p:tnLst>
+      <p:par>
+        <p:cTn id="1" dur="indefinite" restart="never" nodeType="tmRoot"/>
+      </p:par>
+    </p:tnLst>
+  </p:timing>
+</p:sld>
+</file>
+
+<file path=ppt/slides/slide14.xml><?xml version="1.0" encoding="utf-8"?>
+<p:sld xmlns:a="http://schemas.openxmlformats.org/drawingml/2006/main" xmlns:r="http://schemas.openxmlformats.org/officeDocument/2006/relationships" xmlns:p="http://schemas.openxmlformats.org/presentationml/2006/main">
+  <p:cSld>
+    <p:spTree>
+      <p:nvGrpSpPr>
+        <p:cNvPr id="1" name=""/>
+        <p:cNvGrpSpPr/>
+        <p:nvPr/>
+      </p:nvGrpSpPr>
+      <p:grpSpPr>
+        <a:xfrm>
+          <a:off x="0" y="0"/>
+          <a:ext cx="0" cy="0"/>
+          <a:chOff x="0" y="0"/>
+          <a:chExt cx="0" cy="0"/>
+        </a:xfrm>
+      </p:grpSpPr>
+      <p:sp>
+        <p:nvSpPr>
+          <p:cNvPr id="2" name="Titel 1"/>
+          <p:cNvSpPr>
+            <a:spLocks noGrp="1"/>
+          </p:cNvSpPr>
+          <p:nvPr>
+            <p:ph type="title"/>
+          </p:nvPr>
+        </p:nvSpPr>
+        <p:spPr/>
+        <p:txBody>
+          <a:bodyPr>
+            <a:normAutofit/>
+          </a:bodyPr>
+          <a:lstStyle/>
+          <a:p>
+            <a:pPr algn="ctr"/>
+            <a:r>
               <a:rPr lang="en-GB" sz="4800" dirty="0" err="1" smtClean="0"/>
               <a:t>Programmet</a:t>
             </a:r>
             <a:endParaRPr lang="en-GB" sz="4800" dirty="0"/>
-          </a:p>
-        </p:txBody>
-      </p:sp>
-      <p:sp>
-        <p:nvSpPr>
-          <p:cNvPr id="3" name="Pladsholder til indhold 2"/>
-          <p:cNvSpPr>
-            <a:spLocks noGrp="1"/>
-          </p:cNvSpPr>
-          <p:nvPr>
-            <p:ph idx="1"/>
-          </p:nvPr>
-        </p:nvSpPr>
-        <p:spPr/>
-        <p:txBody>
-          <a:bodyPr/>
-          <a:lstStyle/>
-          <a:p>
-            <a:endParaRPr lang="en-GB" dirty="0"/>
           </a:p>
         </p:txBody>
       </p:sp>
@@ -6239,7 +6242,7 @@
 </p:sld>
 </file>
 
-<file path=ppt/slides/slide14.xml><?xml version="1.0" encoding="utf-8"?>
+<file path=ppt/slides/slide15.xml><?xml version="1.0" encoding="utf-8"?>
 <p:sld xmlns:a="http://schemas.openxmlformats.org/drawingml/2006/main" xmlns:r="http://schemas.openxmlformats.org/officeDocument/2006/relationships" xmlns:p="http://schemas.openxmlformats.org/presentationml/2006/main">
   <p:cSld>
     <p:spTree>
@@ -7012,7 +7015,15 @@
           <a:p>
             <a:r>
               <a:rPr lang="en-GB" dirty="0" err="1" smtClean="0"/>
-              <a:t>Svømningpupolariteten</a:t>
+              <a:t>Svømme</a:t>
+            </a:r>
+            <a:r>
+              <a:rPr lang="en-GB" dirty="0"/>
+              <a:t> </a:t>
+            </a:r>
+            <a:r>
+              <a:rPr lang="en-GB" dirty="0" err="1" smtClean="0"/>
+              <a:t>pupolariteten</a:t>
             </a:r>
             <a:endParaRPr lang="en-GB" dirty="0"/>
           </a:p>
@@ -7120,16 +7131,10 @@
           <a:lstStyle/>
           <a:p>
             <a:r>
-              <a:rPr lang="en-GB" dirty="0" err="1" smtClean="0"/>
-              <a:t>Forretningsgrundlag</a:t>
-            </a:r>
-            <a:endParaRPr lang="en-GB" dirty="0" smtClean="0"/>
-          </a:p>
-          <a:p>
-            <a:r>
               <a:rPr lang="en-GB" dirty="0" smtClean="0"/>
               <a:t>Mission</a:t>
             </a:r>
+            <a:endParaRPr lang="en-GB" dirty="0" smtClean="0"/>
           </a:p>
           <a:p>
             <a:r>

</xml_diff>